<commit_message>
Finished Examples, and modified Segway code to match
</commit_message>
<xml_diff>
--- a/example/schematics.pptx
+++ b/example/schematics.pptx
@@ -6,7 +6,8 @@
   </p:sldMasterIdLst>
   <p:sldIdLst>
     <p:sldId id="256" r:id="rId2"/>
-    <p:sldId id="257" r:id="rId3"/>
+    <p:sldId id="258" r:id="rId3"/>
+    <p:sldId id="257" r:id="rId4"/>
   </p:sldIdLst>
   <p:sldSz cx="12192000" cy="6858000"/>
   <p:notesSz cx="6858000" cy="9144000"/>
@@ -105,6 +106,11 @@
       </a:defRPr>
     </a:lvl9pPr>
   </p:defaultTextStyle>
+  <p:extLst>
+    <p:ext uri="{EFAFB233-063F-42B5-8137-9DF3F51BA10A}">
+      <p15:sldGuideLst xmlns:p15="http://schemas.microsoft.com/office/powerpoint/2012/main"/>
+    </p:ext>
+  </p:extLst>
 </p:presentation>
 </file>
 
@@ -255,7 +261,7 @@
           <a:p>
             <a:fld id="{B82A1445-8A45-4836-9C5F-041B9F1FAC4C}" type="datetimeFigureOut">
               <a:rPr lang="en-US" smtClean="0"/>
-              <a:t>10/17/2020</a:t>
+              <a:t>10/29/2020</a:t>
             </a:fld>
             <a:endParaRPr lang="en-US"/>
           </a:p>
@@ -453,7 +459,7 @@
           <a:p>
             <a:fld id="{B82A1445-8A45-4836-9C5F-041B9F1FAC4C}" type="datetimeFigureOut">
               <a:rPr lang="en-US" smtClean="0"/>
-              <a:t>10/17/2020</a:t>
+              <a:t>10/29/2020</a:t>
             </a:fld>
             <a:endParaRPr lang="en-US"/>
           </a:p>
@@ -661,7 +667,7 @@
           <a:p>
             <a:fld id="{B82A1445-8A45-4836-9C5F-041B9F1FAC4C}" type="datetimeFigureOut">
               <a:rPr lang="en-US" smtClean="0"/>
-              <a:t>10/17/2020</a:t>
+              <a:t>10/29/2020</a:t>
             </a:fld>
             <a:endParaRPr lang="en-US"/>
           </a:p>
@@ -859,7 +865,7 @@
           <a:p>
             <a:fld id="{B82A1445-8A45-4836-9C5F-041B9F1FAC4C}" type="datetimeFigureOut">
               <a:rPr lang="en-US" smtClean="0"/>
-              <a:t>10/17/2020</a:t>
+              <a:t>10/29/2020</a:t>
             </a:fld>
             <a:endParaRPr lang="en-US"/>
           </a:p>
@@ -1134,7 +1140,7 @@
           <a:p>
             <a:fld id="{B82A1445-8A45-4836-9C5F-041B9F1FAC4C}" type="datetimeFigureOut">
               <a:rPr lang="en-US" smtClean="0"/>
-              <a:t>10/17/2020</a:t>
+              <a:t>10/29/2020</a:t>
             </a:fld>
             <a:endParaRPr lang="en-US"/>
           </a:p>
@@ -1399,7 +1405,7 @@
           <a:p>
             <a:fld id="{B82A1445-8A45-4836-9C5F-041B9F1FAC4C}" type="datetimeFigureOut">
               <a:rPr lang="en-US" smtClean="0"/>
-              <a:t>10/17/2020</a:t>
+              <a:t>10/29/2020</a:t>
             </a:fld>
             <a:endParaRPr lang="en-US"/>
           </a:p>
@@ -1811,7 +1817,7 @@
           <a:p>
             <a:fld id="{B82A1445-8A45-4836-9C5F-041B9F1FAC4C}" type="datetimeFigureOut">
               <a:rPr lang="en-US" smtClean="0"/>
-              <a:t>10/17/2020</a:t>
+              <a:t>10/29/2020</a:t>
             </a:fld>
             <a:endParaRPr lang="en-US"/>
           </a:p>
@@ -1952,7 +1958,7 @@
           <a:p>
             <a:fld id="{B82A1445-8A45-4836-9C5F-041B9F1FAC4C}" type="datetimeFigureOut">
               <a:rPr lang="en-US" smtClean="0"/>
-              <a:t>10/17/2020</a:t>
+              <a:t>10/29/2020</a:t>
             </a:fld>
             <a:endParaRPr lang="en-US"/>
           </a:p>
@@ -2065,7 +2071,7 @@
           <a:p>
             <a:fld id="{B82A1445-8A45-4836-9C5F-041B9F1FAC4C}" type="datetimeFigureOut">
               <a:rPr lang="en-US" smtClean="0"/>
-              <a:t>10/17/2020</a:t>
+              <a:t>10/29/2020</a:t>
             </a:fld>
             <a:endParaRPr lang="en-US"/>
           </a:p>
@@ -2376,7 +2382,7 @@
           <a:p>
             <a:fld id="{B82A1445-8A45-4836-9C5F-041B9F1FAC4C}" type="datetimeFigureOut">
               <a:rPr lang="en-US" smtClean="0"/>
-              <a:t>10/17/2020</a:t>
+              <a:t>10/29/2020</a:t>
             </a:fld>
             <a:endParaRPr lang="en-US"/>
           </a:p>
@@ -2664,7 +2670,7 @@
           <a:p>
             <a:fld id="{B82A1445-8A45-4836-9C5F-041B9F1FAC4C}" type="datetimeFigureOut">
               <a:rPr lang="en-US" smtClean="0"/>
-              <a:t>10/17/2020</a:t>
+              <a:t>10/29/2020</a:t>
             </a:fld>
             <a:endParaRPr lang="en-US"/>
           </a:p>
@@ -2905,7 +2911,7 @@
           <a:p>
             <a:fld id="{B82A1445-8A45-4836-9C5F-041B9F1FAC4C}" type="datetimeFigureOut">
               <a:rPr lang="en-US" smtClean="0"/>
-              <a:t>10/17/2020</a:t>
+              <a:t>10/29/2020</a:t>
             </a:fld>
             <a:endParaRPr lang="en-US"/>
           </a:p>
@@ -3849,6 +3855,957 @@
 </file>
 
 <file path=ppt/slides/slide2.xml><?xml version="1.0" encoding="utf-8"?>
+<p:sld xmlns:a="http://schemas.openxmlformats.org/drawingml/2006/main" xmlns:r="http://schemas.openxmlformats.org/officeDocument/2006/relationships" xmlns:p="http://schemas.openxmlformats.org/presentationml/2006/main">
+  <p:cSld>
+    <p:spTree>
+      <p:nvGrpSpPr>
+        <p:cNvPr id="1" name=""/>
+        <p:cNvGrpSpPr/>
+        <p:nvPr/>
+      </p:nvGrpSpPr>
+      <p:grpSpPr>
+        <a:xfrm>
+          <a:off x="0" y="0"/>
+          <a:ext cx="0" cy="0"/>
+          <a:chOff x="0" y="0"/>
+          <a:chExt cx="0" cy="0"/>
+        </a:xfrm>
+      </p:grpSpPr>
+      <p:grpSp>
+        <p:nvGrpSpPr>
+          <p:cNvPr id="2" name="Group 1">
+            <a:extLst>
+              <a:ext uri="{FF2B5EF4-FFF2-40B4-BE49-F238E27FC236}">
+                <a16:creationId xmlns:a16="http://schemas.microsoft.com/office/drawing/2014/main" id="{73EF0948-6579-4E47-948A-3B5405B96D45}"/>
+              </a:ext>
+            </a:extLst>
+          </p:cNvPr>
+          <p:cNvGrpSpPr/>
+          <p:nvPr/>
+        </p:nvGrpSpPr>
+        <p:grpSpPr>
+          <a:xfrm rot="20278385">
+            <a:off x="0" y="2761807"/>
+            <a:ext cx="12192000" cy="1639112"/>
+            <a:chOff x="0" y="2761807"/>
+            <a:chExt cx="12192000" cy="1639112"/>
+          </a:xfrm>
+        </p:grpSpPr>
+        <p:cxnSp>
+          <p:nvCxnSpPr>
+            <p:cNvPr id="5" name="Straight Connector 4">
+              <a:extLst>
+                <a:ext uri="{FF2B5EF4-FFF2-40B4-BE49-F238E27FC236}">
+                  <a16:creationId xmlns:a16="http://schemas.microsoft.com/office/drawing/2014/main" id="{3D57B194-BFF1-4FE5-A965-A420266353A6}"/>
+                </a:ext>
+              </a:extLst>
+            </p:cNvPr>
+            <p:cNvCxnSpPr/>
+            <p:nvPr/>
+          </p:nvCxnSpPr>
+          <p:spPr>
+            <a:xfrm>
+              <a:off x="0" y="4400919"/>
+              <a:ext cx="12192000" cy="0"/>
+            </a:xfrm>
+            <a:prstGeom prst="line">
+              <a:avLst/>
+            </a:prstGeom>
+            <a:ln w="76200">
+              <a:solidFill>
+                <a:schemeClr val="tx1"/>
+              </a:solidFill>
+            </a:ln>
+          </p:spPr>
+          <p:style>
+            <a:lnRef idx="1">
+              <a:schemeClr val="accent1"/>
+            </a:lnRef>
+            <a:fillRef idx="0">
+              <a:schemeClr val="accent1"/>
+            </a:fillRef>
+            <a:effectRef idx="0">
+              <a:schemeClr val="accent1"/>
+            </a:effectRef>
+            <a:fontRef idx="minor">
+              <a:schemeClr val="tx1"/>
+            </a:fontRef>
+          </p:style>
+        </p:cxnSp>
+        <p:sp>
+          <p:nvSpPr>
+            <p:cNvPr id="6" name="Rectangle: Rounded Corners 5">
+              <a:extLst>
+                <a:ext uri="{FF2B5EF4-FFF2-40B4-BE49-F238E27FC236}">
+                  <a16:creationId xmlns:a16="http://schemas.microsoft.com/office/drawing/2014/main" id="{CD133594-FA3A-4843-8292-1D1F7FEC07EF}"/>
+                </a:ext>
+              </a:extLst>
+            </p:cNvPr>
+            <p:cNvSpPr/>
+            <p:nvPr/>
+          </p:nvSpPr>
+          <p:spPr>
+            <a:xfrm>
+              <a:off x="2530823" y="3014570"/>
+              <a:ext cx="1923190" cy="914388"/>
+            </a:xfrm>
+            <a:prstGeom prst="roundRect">
+              <a:avLst/>
+            </a:prstGeom>
+          </p:spPr>
+          <p:style>
+            <a:lnRef idx="2">
+              <a:schemeClr val="accent1">
+                <a:shade val="50000"/>
+              </a:schemeClr>
+            </a:lnRef>
+            <a:fillRef idx="1">
+              <a:schemeClr val="accent1"/>
+            </a:fillRef>
+            <a:effectRef idx="0">
+              <a:schemeClr val="accent1"/>
+            </a:effectRef>
+            <a:fontRef idx="minor">
+              <a:schemeClr val="lt1"/>
+            </a:fontRef>
+          </p:style>
+          <p:txBody>
+            <a:bodyPr rtlCol="0" anchor="ctr"/>
+            <a:lstStyle/>
+            <a:p>
+              <a:pPr algn="ctr"/>
+              <a:endParaRPr lang="en-US"/>
+            </a:p>
+          </p:txBody>
+        </p:sp>
+        <p:sp>
+          <p:nvSpPr>
+            <p:cNvPr id="7" name="Rectangle: Rounded Corners 6">
+              <a:extLst>
+                <a:ext uri="{FF2B5EF4-FFF2-40B4-BE49-F238E27FC236}">
+                  <a16:creationId xmlns:a16="http://schemas.microsoft.com/office/drawing/2014/main" id="{E78E513C-F60D-4B60-AD0C-F07A80F0E506}"/>
+                </a:ext>
+              </a:extLst>
+            </p:cNvPr>
+            <p:cNvSpPr/>
+            <p:nvPr/>
+          </p:nvSpPr>
+          <p:spPr>
+            <a:xfrm>
+              <a:off x="3692999" y="3014570"/>
+              <a:ext cx="766916" cy="318565"/>
+            </a:xfrm>
+            <a:prstGeom prst="roundRect">
+              <a:avLst>
+                <a:gd name="adj" fmla="val 50000"/>
+              </a:avLst>
+            </a:prstGeom>
+            <a:gradFill flip="none" rotWithShape="1">
+              <a:gsLst>
+                <a:gs pos="0">
+                  <a:schemeClr val="accent1">
+                    <a:tint val="66000"/>
+                    <a:satMod val="160000"/>
+                  </a:schemeClr>
+                </a:gs>
+                <a:gs pos="50000">
+                  <a:schemeClr val="accent1">
+                    <a:tint val="44500"/>
+                    <a:satMod val="160000"/>
+                  </a:schemeClr>
+                </a:gs>
+                <a:gs pos="100000">
+                  <a:schemeClr val="accent1">
+                    <a:tint val="23500"/>
+                    <a:satMod val="160000"/>
+                  </a:schemeClr>
+                </a:gs>
+              </a:gsLst>
+              <a:path path="circle">
+                <a:fillToRect t="100000" r="100000"/>
+              </a:path>
+              <a:tileRect l="-100000" b="-100000"/>
+            </a:gradFill>
+          </p:spPr>
+          <p:style>
+            <a:lnRef idx="2">
+              <a:schemeClr val="accent1">
+                <a:shade val="50000"/>
+              </a:schemeClr>
+            </a:lnRef>
+            <a:fillRef idx="1">
+              <a:schemeClr val="accent1"/>
+            </a:fillRef>
+            <a:effectRef idx="0">
+              <a:schemeClr val="accent1"/>
+            </a:effectRef>
+            <a:fontRef idx="minor">
+              <a:schemeClr val="lt1"/>
+            </a:fontRef>
+          </p:style>
+          <p:txBody>
+            <a:bodyPr rtlCol="0" anchor="ctr"/>
+            <a:lstStyle/>
+            <a:p>
+              <a:pPr algn="ctr"/>
+              <a:endParaRPr lang="en-US"/>
+            </a:p>
+          </p:txBody>
+        </p:sp>
+        <p:sp>
+          <p:nvSpPr>
+            <p:cNvPr id="8" name="Oval 7">
+              <a:extLst>
+                <a:ext uri="{FF2B5EF4-FFF2-40B4-BE49-F238E27FC236}">
+                  <a16:creationId xmlns:a16="http://schemas.microsoft.com/office/drawing/2014/main" id="{EEE4C3B6-FBD3-4F87-ADE3-7DE5E7FDB594}"/>
+                </a:ext>
+              </a:extLst>
+            </p:cNvPr>
+            <p:cNvSpPr/>
+            <p:nvPr/>
+          </p:nvSpPr>
+          <p:spPr>
+            <a:xfrm>
+              <a:off x="2613414" y="3840480"/>
+              <a:ext cx="560439" cy="560439"/>
+            </a:xfrm>
+            <a:prstGeom prst="ellipse">
+              <a:avLst/>
+            </a:prstGeom>
+          </p:spPr>
+          <p:style>
+            <a:lnRef idx="1">
+              <a:schemeClr val="dk1"/>
+            </a:lnRef>
+            <a:fillRef idx="2">
+              <a:schemeClr val="dk1"/>
+            </a:fillRef>
+            <a:effectRef idx="1">
+              <a:schemeClr val="dk1"/>
+            </a:effectRef>
+            <a:fontRef idx="minor">
+              <a:schemeClr val="dk1"/>
+            </a:fontRef>
+          </p:style>
+          <p:txBody>
+            <a:bodyPr rtlCol="0" anchor="ctr"/>
+            <a:lstStyle/>
+            <a:p>
+              <a:pPr algn="ctr"/>
+              <a:endParaRPr lang="en-US"/>
+            </a:p>
+          </p:txBody>
+        </p:sp>
+        <p:sp>
+          <p:nvSpPr>
+            <p:cNvPr id="9" name="Oval 8">
+              <a:extLst>
+                <a:ext uri="{FF2B5EF4-FFF2-40B4-BE49-F238E27FC236}">
+                  <a16:creationId xmlns:a16="http://schemas.microsoft.com/office/drawing/2014/main" id="{BFB41B58-E5EA-4C10-A5D5-D213D8912C42}"/>
+                </a:ext>
+              </a:extLst>
+            </p:cNvPr>
+            <p:cNvSpPr/>
+            <p:nvPr/>
+          </p:nvSpPr>
+          <p:spPr>
+            <a:xfrm>
+              <a:off x="3839497" y="3840479"/>
+              <a:ext cx="560439" cy="560439"/>
+            </a:xfrm>
+            <a:prstGeom prst="ellipse">
+              <a:avLst/>
+            </a:prstGeom>
+          </p:spPr>
+          <p:style>
+            <a:lnRef idx="1">
+              <a:schemeClr val="dk1"/>
+            </a:lnRef>
+            <a:fillRef idx="2">
+              <a:schemeClr val="dk1"/>
+            </a:fillRef>
+            <a:effectRef idx="1">
+              <a:schemeClr val="dk1"/>
+            </a:effectRef>
+            <a:fontRef idx="minor">
+              <a:schemeClr val="dk1"/>
+            </a:fontRef>
+          </p:style>
+          <p:txBody>
+            <a:bodyPr rtlCol="0" anchor="ctr"/>
+            <a:lstStyle/>
+            <a:p>
+              <a:pPr algn="ctr"/>
+              <a:endParaRPr lang="en-US"/>
+            </a:p>
+          </p:txBody>
+        </p:sp>
+        <p:sp>
+          <p:nvSpPr>
+            <p:cNvPr id="10" name="Star: 5 Points 9">
+              <a:extLst>
+                <a:ext uri="{FF2B5EF4-FFF2-40B4-BE49-F238E27FC236}">
+                  <a16:creationId xmlns:a16="http://schemas.microsoft.com/office/drawing/2014/main" id="{822E15B6-1017-4C1B-BABB-1150A30E0CC9}"/>
+                </a:ext>
+              </a:extLst>
+            </p:cNvPr>
+            <p:cNvSpPr/>
+            <p:nvPr/>
+          </p:nvSpPr>
+          <p:spPr>
+            <a:xfrm>
+              <a:off x="6841287" y="3187129"/>
+              <a:ext cx="525042" cy="507338"/>
+            </a:xfrm>
+            <a:prstGeom prst="star5">
+              <a:avLst/>
+            </a:prstGeom>
+            <a:solidFill>
+              <a:srgbClr val="C00000"/>
+            </a:solidFill>
+            <a:ln>
+              <a:solidFill>
+                <a:schemeClr val="tx1"/>
+              </a:solidFill>
+            </a:ln>
+          </p:spPr>
+          <p:style>
+            <a:lnRef idx="2">
+              <a:schemeClr val="accent1">
+                <a:shade val="50000"/>
+              </a:schemeClr>
+            </a:lnRef>
+            <a:fillRef idx="1">
+              <a:schemeClr val="accent1"/>
+            </a:fillRef>
+            <a:effectRef idx="0">
+              <a:schemeClr val="accent1"/>
+            </a:effectRef>
+            <a:fontRef idx="minor">
+              <a:schemeClr val="lt1"/>
+            </a:fontRef>
+          </p:style>
+          <p:txBody>
+            <a:bodyPr rtlCol="0" anchor="ctr"/>
+            <a:lstStyle/>
+            <a:p>
+              <a:pPr algn="ctr"/>
+              <a:endParaRPr lang="en-US"/>
+            </a:p>
+          </p:txBody>
+        </p:sp>
+        <p:sp>
+          <p:nvSpPr>
+            <p:cNvPr id="11" name="Oval 10">
+              <a:extLst>
+                <a:ext uri="{FF2B5EF4-FFF2-40B4-BE49-F238E27FC236}">
+                  <a16:creationId xmlns:a16="http://schemas.microsoft.com/office/drawing/2014/main" id="{371DCCD3-9EE5-41F9-AF26-FEB3AA7F129A}"/>
+                </a:ext>
+              </a:extLst>
+            </p:cNvPr>
+            <p:cNvSpPr/>
+            <p:nvPr/>
+          </p:nvSpPr>
+          <p:spPr>
+            <a:xfrm>
+              <a:off x="3412777" y="3392123"/>
+              <a:ext cx="159282" cy="159282"/>
+            </a:xfrm>
+            <a:prstGeom prst="ellipse">
+              <a:avLst/>
+            </a:prstGeom>
+          </p:spPr>
+          <p:style>
+            <a:lnRef idx="2">
+              <a:schemeClr val="dk1">
+                <a:shade val="50000"/>
+              </a:schemeClr>
+            </a:lnRef>
+            <a:fillRef idx="1">
+              <a:schemeClr val="dk1"/>
+            </a:fillRef>
+            <a:effectRef idx="0">
+              <a:schemeClr val="dk1"/>
+            </a:effectRef>
+            <a:fontRef idx="minor">
+              <a:schemeClr val="lt1"/>
+            </a:fontRef>
+          </p:style>
+          <p:txBody>
+            <a:bodyPr rtlCol="0" anchor="ctr"/>
+            <a:lstStyle/>
+            <a:p>
+              <a:pPr algn="ctr"/>
+              <a:endParaRPr lang="en-US"/>
+            </a:p>
+          </p:txBody>
+        </p:sp>
+        <p:pic>
+          <p:nvPicPr>
+            <p:cNvPr id="44" name="Picture 43">
+              <a:extLst>
+                <a:ext uri="{FF2B5EF4-FFF2-40B4-BE49-F238E27FC236}">
+                  <a16:creationId xmlns:a16="http://schemas.microsoft.com/office/drawing/2014/main" id="{9E52B2E2-12D5-4C84-BB49-0B3AD8646738}"/>
+                </a:ext>
+              </a:extLst>
+            </p:cNvPr>
+            <p:cNvPicPr>
+              <a:picLocks noChangeAspect="1"/>
+            </p:cNvPicPr>
+            <p:nvPr>
+              <p:custDataLst>
+                <p:tags r:id="rId5"/>
+              </p:custDataLst>
+            </p:nvPr>
+          </p:nvPicPr>
+          <p:blipFill>
+            <a:blip r:embed="rId9">
+              <a:extLst>
+                <a:ext uri="{28A0092B-C50C-407E-A947-70E740481C1C}">
+                  <a14:useLocalDpi xmlns:a14="http://schemas.microsoft.com/office/drawing/2010/main" val="0"/>
+                </a:ext>
+              </a:extLst>
+            </a:blip>
+            <a:stretch>
+              <a:fillRect/>
+            </a:stretch>
+          </p:blipFill>
+          <p:spPr>
+            <a:xfrm>
+              <a:off x="2977350" y="3142908"/>
+              <a:ext cx="356675" cy="498429"/>
+            </a:xfrm>
+            <a:prstGeom prst="rect">
+              <a:avLst/>
+            </a:prstGeom>
+          </p:spPr>
+        </p:pic>
+        <p:cxnSp>
+          <p:nvCxnSpPr>
+            <p:cNvPr id="20" name="Straight Arrow Connector 19">
+              <a:extLst>
+                <a:ext uri="{FF2B5EF4-FFF2-40B4-BE49-F238E27FC236}">
+                  <a16:creationId xmlns:a16="http://schemas.microsoft.com/office/drawing/2014/main" id="{265D54CB-912D-499D-8FA8-544B7EC6D3E6}"/>
+                </a:ext>
+              </a:extLst>
+            </p:cNvPr>
+            <p:cNvCxnSpPr>
+              <a:stCxn id="6" idx="3"/>
+            </p:cNvCxnSpPr>
+            <p:nvPr/>
+          </p:nvCxnSpPr>
+          <p:spPr>
+            <a:xfrm>
+              <a:off x="4454013" y="3471764"/>
+              <a:ext cx="896702" cy="0"/>
+            </a:xfrm>
+            <a:prstGeom prst="straightConnector1">
+              <a:avLst/>
+            </a:prstGeom>
+            <a:ln w="57150">
+              <a:solidFill>
+                <a:schemeClr val="tx1"/>
+              </a:solidFill>
+              <a:tailEnd type="triangle"/>
+            </a:ln>
+          </p:spPr>
+          <p:style>
+            <a:lnRef idx="1">
+              <a:schemeClr val="accent1"/>
+            </a:lnRef>
+            <a:fillRef idx="0">
+              <a:schemeClr val="accent1"/>
+            </a:fillRef>
+            <a:effectRef idx="0">
+              <a:schemeClr val="accent1"/>
+            </a:effectRef>
+            <a:fontRef idx="minor">
+              <a:schemeClr val="tx1"/>
+            </a:fontRef>
+          </p:style>
+        </p:cxnSp>
+        <p:pic>
+          <p:nvPicPr>
+            <p:cNvPr id="24" name="Picture 23">
+              <a:extLst>
+                <a:ext uri="{FF2B5EF4-FFF2-40B4-BE49-F238E27FC236}">
+                  <a16:creationId xmlns:a16="http://schemas.microsoft.com/office/drawing/2014/main" id="{659BA9AC-05C1-42E5-B77D-31397B1EA02A}"/>
+                </a:ext>
+              </a:extLst>
+            </p:cNvPr>
+            <p:cNvPicPr>
+              <a:picLocks noChangeAspect="1"/>
+            </p:cNvPicPr>
+            <p:nvPr>
+              <p:custDataLst>
+                <p:tags r:id="rId6"/>
+              </p:custDataLst>
+            </p:nvPr>
+          </p:nvPicPr>
+          <p:blipFill>
+            <a:blip r:embed="rId10">
+              <a:extLst>
+                <a:ext uri="{28A0092B-C50C-407E-A947-70E740481C1C}">
+                  <a14:useLocalDpi xmlns:a14="http://schemas.microsoft.com/office/drawing/2010/main" val="0"/>
+                </a:ext>
+              </a:extLst>
+            </a:blip>
+            <a:stretch>
+              <a:fillRect/>
+            </a:stretch>
+          </p:blipFill>
+          <p:spPr>
+            <a:xfrm>
+              <a:off x="4545684" y="3130476"/>
+              <a:ext cx="874667" cy="175238"/>
+            </a:xfrm>
+            <a:prstGeom prst="rect">
+              <a:avLst/>
+            </a:prstGeom>
+          </p:spPr>
+        </p:pic>
+        <p:pic>
+          <p:nvPicPr>
+            <p:cNvPr id="42" name="Picture 41">
+              <a:extLst>
+                <a:ext uri="{FF2B5EF4-FFF2-40B4-BE49-F238E27FC236}">
+                  <a16:creationId xmlns:a16="http://schemas.microsoft.com/office/drawing/2014/main" id="{1A5A727B-5458-4049-9760-459B924822BD}"/>
+                </a:ext>
+              </a:extLst>
+            </p:cNvPr>
+            <p:cNvPicPr>
+              <a:picLocks noChangeAspect="1"/>
+            </p:cNvPicPr>
+            <p:nvPr>
+              <p:custDataLst>
+                <p:tags r:id="rId7"/>
+              </p:custDataLst>
+            </p:nvPr>
+          </p:nvPicPr>
+          <p:blipFill>
+            <a:blip r:embed="rId11">
+              <a:extLst>
+                <a:ext uri="{28A0092B-C50C-407E-A947-70E740481C1C}">
+                  <a14:useLocalDpi xmlns:a14="http://schemas.microsoft.com/office/drawing/2010/main" val="0"/>
+                </a:ext>
+              </a:extLst>
+            </a:blip>
+            <a:stretch>
+              <a:fillRect/>
+            </a:stretch>
+          </p:blipFill>
+          <p:spPr>
+            <a:xfrm>
+              <a:off x="7276804" y="2761807"/>
+              <a:ext cx="591223" cy="454627"/>
+            </a:xfrm>
+            <a:prstGeom prst="rect">
+              <a:avLst/>
+            </a:prstGeom>
+          </p:spPr>
+        </p:pic>
+      </p:grpSp>
+      <p:cxnSp>
+        <p:nvCxnSpPr>
+          <p:cNvPr id="4" name="Straight Connector 3">
+            <a:extLst>
+              <a:ext uri="{FF2B5EF4-FFF2-40B4-BE49-F238E27FC236}">
+                <a16:creationId xmlns:a16="http://schemas.microsoft.com/office/drawing/2014/main" id="{2F91B027-3C77-41B7-A36F-018595A54A9E}"/>
+              </a:ext>
+            </a:extLst>
+          </p:cNvPr>
+          <p:cNvCxnSpPr/>
+          <p:nvPr/>
+        </p:nvCxnSpPr>
+        <p:spPr>
+          <a:xfrm>
+            <a:off x="752328" y="6627355"/>
+            <a:ext cx="11389849" cy="0"/>
+          </a:xfrm>
+          <a:prstGeom prst="line">
+            <a:avLst/>
+          </a:prstGeom>
+          <a:ln w="76200">
+            <a:solidFill>
+              <a:schemeClr val="tx1">
+                <a:lumMod val="50000"/>
+                <a:lumOff val="50000"/>
+              </a:schemeClr>
+            </a:solidFill>
+          </a:ln>
+        </p:spPr>
+        <p:style>
+          <a:lnRef idx="3">
+            <a:schemeClr val="dk1"/>
+          </a:lnRef>
+          <a:fillRef idx="0">
+            <a:schemeClr val="dk1"/>
+          </a:fillRef>
+          <a:effectRef idx="2">
+            <a:schemeClr val="dk1"/>
+          </a:effectRef>
+          <a:fontRef idx="minor">
+            <a:schemeClr val="tx1"/>
+          </a:fontRef>
+        </p:style>
+      </p:cxnSp>
+      <p:sp>
+        <p:nvSpPr>
+          <p:cNvPr id="16" name="Arc 15">
+            <a:extLst>
+              <a:ext uri="{FF2B5EF4-FFF2-40B4-BE49-F238E27FC236}">
+                <a16:creationId xmlns:a16="http://schemas.microsoft.com/office/drawing/2014/main" id="{15E09205-15DA-4ECB-8A23-529D1841ACB6}"/>
+              </a:ext>
+            </a:extLst>
+          </p:cNvPr>
+          <p:cNvSpPr/>
+          <p:nvPr/>
+        </p:nvSpPr>
+        <p:spPr>
+          <a:xfrm>
+            <a:off x="1481504" y="5758170"/>
+            <a:ext cx="914400" cy="914400"/>
+          </a:xfrm>
+          <a:prstGeom prst="arc">
+            <a:avLst>
+              <a:gd name="adj1" fmla="val 19819733"/>
+              <a:gd name="adj2" fmla="val 3779241"/>
+            </a:avLst>
+          </a:prstGeom>
+          <a:ln w="57150">
+            <a:solidFill>
+              <a:schemeClr val="tx1">
+                <a:lumMod val="50000"/>
+                <a:lumOff val="50000"/>
+              </a:schemeClr>
+            </a:solidFill>
+          </a:ln>
+        </p:spPr>
+        <p:style>
+          <a:lnRef idx="1">
+            <a:schemeClr val="accent1"/>
+          </a:lnRef>
+          <a:fillRef idx="0">
+            <a:schemeClr val="accent1"/>
+          </a:fillRef>
+          <a:effectRef idx="0">
+            <a:schemeClr val="accent1"/>
+          </a:effectRef>
+          <a:fontRef idx="minor">
+            <a:schemeClr val="tx1"/>
+          </a:fontRef>
+        </p:style>
+        <p:txBody>
+          <a:bodyPr rtlCol="0" anchor="ctr"/>
+          <a:lstStyle/>
+          <a:p>
+            <a:pPr algn="ctr"/>
+            <a:endParaRPr lang="en-US"/>
+          </a:p>
+        </p:txBody>
+      </p:sp>
+      <p:pic>
+        <p:nvPicPr>
+          <p:cNvPr id="19" name="Picture 18">
+            <a:extLst>
+              <a:ext uri="{FF2B5EF4-FFF2-40B4-BE49-F238E27FC236}">
+                <a16:creationId xmlns:a16="http://schemas.microsoft.com/office/drawing/2014/main" id="{657786EF-169E-471E-993B-EE782FDF1A23}"/>
+              </a:ext>
+            </a:extLst>
+          </p:cNvPr>
+          <p:cNvPicPr>
+            <a:picLocks noChangeAspect="1"/>
+          </p:cNvPicPr>
+          <p:nvPr>
+            <p:custDataLst>
+              <p:tags r:id="rId1"/>
+            </p:custDataLst>
+          </p:nvPr>
+        </p:nvPicPr>
+        <p:blipFill>
+          <a:blip r:embed="rId12">
+            <a:extLst>
+              <a:ext uri="{28A0092B-C50C-407E-A947-70E740481C1C}">
+                <a14:useLocalDpi xmlns:a14="http://schemas.microsoft.com/office/drawing/2010/main" val="0"/>
+              </a:ext>
+            </a:extLst>
+          </a:blip>
+          <a:stretch>
+            <a:fillRect/>
+          </a:stretch>
+        </p:blipFill>
+        <p:spPr>
+          <a:xfrm>
+            <a:off x="2655316" y="5982416"/>
+            <a:ext cx="528515" cy="421689"/>
+          </a:xfrm>
+          <a:prstGeom prst="rect">
+            <a:avLst/>
+          </a:prstGeom>
+        </p:spPr>
+      </p:pic>
+      <p:cxnSp>
+        <p:nvCxnSpPr>
+          <p:cNvPr id="22" name="Straight Arrow Connector 21">
+            <a:extLst>
+              <a:ext uri="{FF2B5EF4-FFF2-40B4-BE49-F238E27FC236}">
+                <a16:creationId xmlns:a16="http://schemas.microsoft.com/office/drawing/2014/main" id="{3124018C-4B53-4C09-AC1C-D08F8556760B}"/>
+              </a:ext>
+            </a:extLst>
+          </p:cNvPr>
+          <p:cNvCxnSpPr/>
+          <p:nvPr/>
+        </p:nvCxnSpPr>
+        <p:spPr>
+          <a:xfrm flipV="1">
+            <a:off x="752328" y="6137031"/>
+            <a:ext cx="1186376" cy="490324"/>
+          </a:xfrm>
+          <a:prstGeom prst="straightConnector1">
+            <a:avLst/>
+          </a:prstGeom>
+          <a:ln w="76200">
+            <a:solidFill>
+              <a:srgbClr val="00B050"/>
+            </a:solidFill>
+            <a:tailEnd type="triangle"/>
+          </a:ln>
+        </p:spPr>
+        <p:style>
+          <a:lnRef idx="3">
+            <a:schemeClr val="accent2"/>
+          </a:lnRef>
+          <a:fillRef idx="0">
+            <a:schemeClr val="accent2"/>
+          </a:fillRef>
+          <a:effectRef idx="2">
+            <a:schemeClr val="accent2"/>
+          </a:effectRef>
+          <a:fontRef idx="minor">
+            <a:schemeClr val="tx1"/>
+          </a:fontRef>
+        </p:style>
+      </p:cxnSp>
+      <p:cxnSp>
+        <p:nvCxnSpPr>
+          <p:cNvPr id="25" name="Straight Arrow Connector 24">
+            <a:extLst>
+              <a:ext uri="{FF2B5EF4-FFF2-40B4-BE49-F238E27FC236}">
+                <a16:creationId xmlns:a16="http://schemas.microsoft.com/office/drawing/2014/main" id="{CDC5E038-0252-4253-B08B-E957E385AB1F}"/>
+              </a:ext>
+            </a:extLst>
+          </p:cNvPr>
+          <p:cNvCxnSpPr/>
+          <p:nvPr/>
+        </p:nvCxnSpPr>
+        <p:spPr>
+          <a:xfrm flipH="1" flipV="1">
+            <a:off x="373673" y="5679831"/>
+            <a:ext cx="378655" cy="947524"/>
+          </a:xfrm>
+          <a:prstGeom prst="straightConnector1">
+            <a:avLst/>
+          </a:prstGeom>
+          <a:ln w="76200">
+            <a:solidFill>
+              <a:srgbClr val="00B050"/>
+            </a:solidFill>
+            <a:tailEnd type="triangle"/>
+          </a:ln>
+        </p:spPr>
+        <p:style>
+          <a:lnRef idx="1">
+            <a:schemeClr val="accent1"/>
+          </a:lnRef>
+          <a:fillRef idx="0">
+            <a:schemeClr val="accent1"/>
+          </a:fillRef>
+          <a:effectRef idx="0">
+            <a:schemeClr val="accent1"/>
+          </a:effectRef>
+          <a:fontRef idx="minor">
+            <a:schemeClr val="tx1"/>
+          </a:fontRef>
+        </p:style>
+      </p:cxnSp>
+      <p:pic>
+        <p:nvPicPr>
+          <p:cNvPr id="28" name="Picture 27">
+            <a:extLst>
+              <a:ext uri="{FF2B5EF4-FFF2-40B4-BE49-F238E27FC236}">
+                <a16:creationId xmlns:a16="http://schemas.microsoft.com/office/drawing/2014/main" id="{0C76635F-5AF7-44DD-8349-407438194CFF}"/>
+              </a:ext>
+            </a:extLst>
+          </p:cNvPr>
+          <p:cNvPicPr>
+            <a:picLocks noChangeAspect="1"/>
+          </p:cNvPicPr>
+          <p:nvPr>
+            <p:custDataLst>
+              <p:tags r:id="rId2"/>
+            </p:custDataLst>
+          </p:nvPr>
+        </p:nvPicPr>
+        <p:blipFill>
+          <a:blip r:embed="rId13">
+            <a:extLst>
+              <a:ext uri="{28A0092B-C50C-407E-A947-70E740481C1C}">
+                <a14:useLocalDpi xmlns:a14="http://schemas.microsoft.com/office/drawing/2010/main" val="0"/>
+              </a:ext>
+            </a:extLst>
+          </a:blip>
+          <a:stretch>
+            <a:fillRect/>
+          </a:stretch>
+        </p:blipFill>
+        <p:spPr>
+          <a:xfrm>
+            <a:off x="1515695" y="5825935"/>
+            <a:ext cx="223407" cy="199471"/>
+          </a:xfrm>
+          <a:prstGeom prst="rect">
+            <a:avLst/>
+          </a:prstGeom>
+        </p:spPr>
+      </p:pic>
+      <p:pic>
+        <p:nvPicPr>
+          <p:cNvPr id="30" name="Picture 29">
+            <a:extLst>
+              <a:ext uri="{FF2B5EF4-FFF2-40B4-BE49-F238E27FC236}">
+                <a16:creationId xmlns:a16="http://schemas.microsoft.com/office/drawing/2014/main" id="{9B54A156-8D87-4F02-BA19-2479217F61F0}"/>
+              </a:ext>
+            </a:extLst>
+          </p:cNvPr>
+          <p:cNvPicPr>
+            <a:picLocks noChangeAspect="1"/>
+          </p:cNvPicPr>
+          <p:nvPr>
+            <p:custDataLst>
+              <p:tags r:id="rId3"/>
+            </p:custDataLst>
+          </p:nvPr>
+        </p:nvPicPr>
+        <p:blipFill>
+          <a:blip r:embed="rId14">
+            <a:extLst>
+              <a:ext uri="{28A0092B-C50C-407E-A947-70E740481C1C}">
+                <a14:useLocalDpi xmlns:a14="http://schemas.microsoft.com/office/drawing/2010/main" val="0"/>
+              </a:ext>
+            </a:extLst>
+          </a:blip>
+          <a:stretch>
+            <a:fillRect/>
+          </a:stretch>
+        </p:blipFill>
+        <p:spPr>
+          <a:xfrm>
+            <a:off x="373673" y="5318913"/>
+            <a:ext cx="207449" cy="284579"/>
+          </a:xfrm>
+          <a:prstGeom prst="rect">
+            <a:avLst/>
+          </a:prstGeom>
+        </p:spPr>
+      </p:pic>
+      <p:cxnSp>
+        <p:nvCxnSpPr>
+          <p:cNvPr id="33" name="Straight Arrow Connector 32">
+            <a:extLst>
+              <a:ext uri="{FF2B5EF4-FFF2-40B4-BE49-F238E27FC236}">
+                <a16:creationId xmlns:a16="http://schemas.microsoft.com/office/drawing/2014/main" id="{6FD2F366-682B-407E-B437-4B36159503D4}"/>
+              </a:ext>
+            </a:extLst>
+          </p:cNvPr>
+          <p:cNvCxnSpPr>
+            <a:cxnSpLocks/>
+          </p:cNvCxnSpPr>
+          <p:nvPr/>
+        </p:nvCxnSpPr>
+        <p:spPr>
+          <a:xfrm flipH="1">
+            <a:off x="3611235" y="4480764"/>
+            <a:ext cx="17560" cy="1536188"/>
+          </a:xfrm>
+          <a:prstGeom prst="straightConnector1">
+            <a:avLst/>
+          </a:prstGeom>
+          <a:ln w="76200">
+            <a:solidFill>
+              <a:schemeClr val="tx1"/>
+            </a:solidFill>
+            <a:tailEnd type="triangle"/>
+          </a:ln>
+        </p:spPr>
+        <p:style>
+          <a:lnRef idx="1">
+            <a:schemeClr val="accent1"/>
+          </a:lnRef>
+          <a:fillRef idx="0">
+            <a:schemeClr val="accent1"/>
+          </a:fillRef>
+          <a:effectRef idx="0">
+            <a:schemeClr val="accent1"/>
+          </a:effectRef>
+          <a:fontRef idx="minor">
+            <a:schemeClr val="tx1"/>
+          </a:fontRef>
+        </p:style>
+      </p:cxnSp>
+      <p:pic>
+        <p:nvPicPr>
+          <p:cNvPr id="37" name="Picture 36">
+            <a:extLst>
+              <a:ext uri="{FF2B5EF4-FFF2-40B4-BE49-F238E27FC236}">
+                <a16:creationId xmlns:a16="http://schemas.microsoft.com/office/drawing/2014/main" id="{4857BBB8-829A-49CD-9228-842E9E57CC19}"/>
+              </a:ext>
+            </a:extLst>
+          </p:cNvPr>
+          <p:cNvPicPr>
+            <a:picLocks noChangeAspect="1"/>
+          </p:cNvPicPr>
+          <p:nvPr>
+            <p:custDataLst>
+              <p:tags r:id="rId4"/>
+            </p:custDataLst>
+          </p:nvPr>
+        </p:nvPicPr>
+        <p:blipFill>
+          <a:blip r:embed="rId15">
+            <a:extLst>
+              <a:ext uri="{28A0092B-C50C-407E-A947-70E740481C1C}">
+                <a14:useLocalDpi xmlns:a14="http://schemas.microsoft.com/office/drawing/2010/main" val="0"/>
+              </a:ext>
+            </a:extLst>
+          </a:blip>
+          <a:stretch>
+            <a:fillRect/>
+          </a:stretch>
+        </p:blipFill>
+        <p:spPr>
+          <a:xfrm>
+            <a:off x="3826025" y="5583933"/>
+            <a:ext cx="950857" cy="210665"/>
+          </a:xfrm>
+          <a:prstGeom prst="rect">
+            <a:avLst/>
+          </a:prstGeom>
+        </p:spPr>
+      </p:pic>
+    </p:spTree>
+    <p:extLst>
+      <p:ext uri="{BB962C8B-B14F-4D97-AF65-F5344CB8AC3E}">
+        <p14:creationId xmlns:p14="http://schemas.microsoft.com/office/powerpoint/2010/main" val="3661151416"/>
+      </p:ext>
+    </p:extLst>
+  </p:cSld>
+  <p:clrMapOvr>
+    <a:masterClrMapping/>
+  </p:clrMapOvr>
+</p:sld>
+</file>
+
+<file path=ppt/slides/slide3.xml><?xml version="1.0" encoding="utf-8"?>
 <p:sld xmlns:a="http://schemas.openxmlformats.org/drawingml/2006/main" xmlns:r="http://schemas.openxmlformats.org/officeDocument/2006/relationships" xmlns:p="http://schemas.openxmlformats.org/presentationml/2006/main">
   <p:cSld>
     <p:spTree>
@@ -6476,6 +7433,139 @@
 <file path=ppt/tags/tag10.xml><?xml version="1.0" encoding="utf-8"?>
 <p:tagLst xmlns:a="http://schemas.openxmlformats.org/drawingml/2006/main" xmlns:r="http://schemas.openxmlformats.org/officeDocument/2006/relationships" xmlns:p="http://schemas.openxmlformats.org/presentationml/2006/main">
   <p:tag name="OUTPUTDPI" val="1200"/>
+  <p:tag name="ORIGINALHEIGHT" val="326.9591"/>
+  <p:tag name="ORIGINALWIDTH" val="425.1968"/>
+  <p:tag name="LATEXADDIN" val="\documentclass{article}&#10;\usepackage{amsmath}&#10;\usepackage{amsmath,amsfonts,amssymb,amsthm}&#10;\usepackage{mathtools}&#10;\usepackage{commath}&#10;\usepackage{graphicx}&#10;\usepackage{parskip}&#10;\usepackage{enumitem}&#10;\usepackage[margin=1.0in]{geometry}&#10;\usepackage[T1]{fontenc}&#10;\usepackage{bigfoot}&#10;\usepackage[numbered,framed]{matlab-prettifier}&#10;\usepackage{filecontents}&#10;\usepackage{textcomp}&#10;\pagestyle{empty}&#10;\begin{document}&#10;&#10;&#10;\begin{align*}&#10;\begin{bmatrix}&#10;p_{goal} \\ v_{goal}&#10;\end{bmatrix}^T&#10;\end{align*}&#10;&#10;\end{document}"/>
+  <p:tag name="IGUANATEXSIZE" val="20"/>
+  <p:tag name="IGUANATEXCURSOR" val="456"/>
+  <p:tag name="TRANSPARENCY" val="True"/>
+  <p:tag name="FILENAME" val=""/>
+  <p:tag name="LATEXENGINEID" val="0"/>
+  <p:tag name="TEMPFOLDER" val="c:\temp\"/>
+  <p:tag name="LATEXFORMHEIGHT" val="403"/>
+  <p:tag name="LATEXFORMWIDTH" val="688"/>
+  <p:tag name="LATEXFORMWRAP" val="True"/>
+  <p:tag name="BITMAPVECTOR" val="0"/>
+</p:tagLst>
+</file>
+
+<file path=ppt/tags/tag11.xml><?xml version="1.0" encoding="utf-8"?>
+<p:tagLst xmlns:a="http://schemas.openxmlformats.org/drawingml/2006/main" xmlns:r="http://schemas.openxmlformats.org/officeDocument/2006/relationships" xmlns:p="http://schemas.openxmlformats.org/presentationml/2006/main">
+  <p:tag name="OUTPUTDPI" val="1200"/>
+  <p:tag name="ORIGINALHEIGHT" val="104.9868"/>
+  <p:tag name="ORIGINALWIDTH" val="145.4818"/>
+  <p:tag name="LATEXADDIN" val="\documentclass{article}&#10;\usepackage{amsmath}&#10;\usepackage{amsmath,amsfonts,amssymb,amsthm}&#10;\usepackage{mathtools}&#10;\usepackage{commath}&#10;\usepackage{graphicx}&#10;\usepackage{parskip}&#10;\usepackage{enumitem}&#10;\usepackage[margin=1.0in]{geometry}&#10;\usepackage[T1]{fontenc}&#10;\usepackage{bigfoot}&#10;\usepackage[numbered,framed]{matlab-prettifier}&#10;\usepackage{filecontents}&#10;\usepackage{textcomp}&#10;\pagestyle{empty}&#10;\begin{document}&#10;&#10;&#10;\begin{align*}&#10;X_0&#10;\end{align*}&#10;&#10;\end{document}"/>
+  <p:tag name="IGUANATEXSIZE" val="20"/>
+  <p:tag name="IGUANATEXCURSOR" val="432"/>
+  <p:tag name="TRANSPARENCY" val="True"/>
+  <p:tag name="FILENAME" val=""/>
+  <p:tag name="LATEXENGINEID" val="0"/>
+  <p:tag name="TEMPFOLDER" val="c:\temp\"/>
+  <p:tag name="LATEXFORMHEIGHT" val="403"/>
+  <p:tag name="LATEXFORMWIDTH" val="688"/>
+  <p:tag name="LATEXFORMWRAP" val="True"/>
+  <p:tag name="BITMAPVECTOR" val="0"/>
+</p:tagLst>
+</file>
+
+<file path=ppt/tags/tag12.xml><?xml version="1.0" encoding="utf-8"?>
+<p:tagLst xmlns:a="http://schemas.openxmlformats.org/drawingml/2006/main" xmlns:r="http://schemas.openxmlformats.org/officeDocument/2006/relationships" xmlns:p="http://schemas.openxmlformats.org/presentationml/2006/main">
+  <p:tag name="OUTPUTDPI" val="1200"/>
+  <p:tag name="ORIGINALHEIGHT" val="103.4871"/>
+  <p:tag name="ORIGINALWIDTH" val="141.7323"/>
+  <p:tag name="LATEXADDIN" val="\documentclass{article}&#10;\usepackage{amsmath}&#10;\usepackage{amsmath,amsfonts,amssymb,amsthm}&#10;\usepackage{mathtools}&#10;\usepackage{commath}&#10;\usepackage{graphicx}&#10;\usepackage{parskip}&#10;\usepackage{enumitem}&#10;\usepackage[margin=1.0in]{geometry}&#10;\usepackage[T1]{fontenc}&#10;\usepackage{bigfoot}&#10;\usepackage[numbered,framed]{matlab-prettifier}&#10;\usepackage{filecontents}&#10;\usepackage{textcomp}&#10;\pagestyle{empty}&#10;\begin{document}&#10;&#10;&#10;\begin{align*}&#10;X_1&#10;\end{align*}&#10;&#10;\end{document}"/>
+  <p:tag name="IGUANATEXSIZE" val="20"/>
+  <p:tag name="IGUANATEXCURSOR" val="432"/>
+  <p:tag name="TRANSPARENCY" val="True"/>
+  <p:tag name="FILENAME" val=""/>
+  <p:tag name="LATEXENGINEID" val="0"/>
+  <p:tag name="TEMPFOLDER" val="c:\temp\"/>
+  <p:tag name="LATEXFORMHEIGHT" val="403"/>
+  <p:tag name="LATEXFORMWIDTH" val="688"/>
+  <p:tag name="LATEXFORMWRAP" val="True"/>
+  <p:tag name="BITMAPVECTOR" val="0"/>
+</p:tagLst>
+</file>
+
+<file path=ppt/tags/tag13.xml><?xml version="1.0" encoding="utf-8"?>
+<p:tagLst xmlns:a="http://schemas.openxmlformats.org/drawingml/2006/main" xmlns:r="http://schemas.openxmlformats.org/officeDocument/2006/relationships" xmlns:p="http://schemas.openxmlformats.org/presentationml/2006/main">
+  <p:tag name="OUTPUTDPI" val="1200"/>
+  <p:tag name="ORIGINALHEIGHT" val="103.4871"/>
+  <p:tag name="ORIGINALWIDTH" val="144.7319"/>
+  <p:tag name="LATEXADDIN" val="\documentclass{article}&#10;\usepackage{amsmath}&#10;\usepackage{amsmath,amsfonts,amssymb,amsthm}&#10;\usepackage{mathtools}&#10;\usepackage{commath}&#10;\usepackage{graphicx}&#10;\usepackage{parskip}&#10;\usepackage{enumitem}&#10;\usepackage[margin=1.0in]{geometry}&#10;\usepackage[T1]{fontenc}&#10;\usepackage{bigfoot}&#10;\usepackage[numbered,framed]{matlab-prettifier}&#10;\usepackage{filecontents}&#10;\usepackage{textcomp}&#10;\pagestyle{empty}&#10;\begin{document}&#10;&#10;&#10;\begin{align*}&#10;X_2&#10;\end{align*}&#10;&#10;\end{document}"/>
+  <p:tag name="IGUANATEXSIZE" val="20"/>
+  <p:tag name="IGUANATEXCURSOR" val="432"/>
+  <p:tag name="TRANSPARENCY" val="True"/>
+  <p:tag name="FILENAME" val=""/>
+  <p:tag name="LATEXENGINEID" val="0"/>
+  <p:tag name="TEMPFOLDER" val="c:\temp\"/>
+  <p:tag name="LATEXFORMHEIGHT" val="403"/>
+  <p:tag name="LATEXFORMWIDTH" val="688"/>
+  <p:tag name="LATEXFORMWRAP" val="True"/>
+  <p:tag name="BITMAPVECTOR" val="0"/>
+</p:tagLst>
+</file>
+
+<file path=ppt/tags/tag14.xml><?xml version="1.0" encoding="utf-8"?>
+<p:tagLst xmlns:a="http://schemas.openxmlformats.org/drawingml/2006/main" xmlns:r="http://schemas.openxmlformats.org/officeDocument/2006/relationships" xmlns:p="http://schemas.openxmlformats.org/presentationml/2006/main">
+  <p:tag name="OUTPUTDPI" val="1200"/>
+  <p:tag name="ORIGINALHEIGHT" val="104.9868"/>
+  <p:tag name="ORIGINALWIDTH" val="145.4818"/>
+  <p:tag name="LATEXADDIN" val="\documentclass{article}&#10;\usepackage{amsmath}&#10;\usepackage{amsmath,amsfonts,amssymb,amsthm}&#10;\usepackage{mathtools}&#10;\usepackage{commath}&#10;\usepackage{graphicx}&#10;\usepackage{parskip}&#10;\usepackage{enumitem}&#10;\usepackage[margin=1.0in]{geometry}&#10;\usepackage[T1]{fontenc}&#10;\usepackage{bigfoot}&#10;\usepackage[numbered,framed]{matlab-prettifier}&#10;\usepackage{filecontents}&#10;\usepackage{textcomp}&#10;\pagestyle{empty}&#10;\begin{document}&#10;&#10;&#10;\begin{align*}&#10;X_3&#10;\end{align*}&#10;&#10;\end{document}"/>
+  <p:tag name="IGUANATEXSIZE" val="20"/>
+  <p:tag name="IGUANATEXCURSOR" val="432"/>
+  <p:tag name="TRANSPARENCY" val="True"/>
+  <p:tag name="FILENAME" val=""/>
+  <p:tag name="LATEXENGINEID" val="0"/>
+  <p:tag name="TEMPFOLDER" val="c:\temp\"/>
+  <p:tag name="LATEXFORMHEIGHT" val="403"/>
+  <p:tag name="LATEXFORMWIDTH" val="688"/>
+  <p:tag name="LATEXFORMWRAP" val="True"/>
+  <p:tag name="BITMAPVECTOR" val="0"/>
+</p:tagLst>
+</file>
+
+<file path=ppt/tags/tag15.xml><?xml version="1.0" encoding="utf-8"?>
+<p:tagLst xmlns:a="http://schemas.openxmlformats.org/drawingml/2006/main" xmlns:r="http://schemas.openxmlformats.org/officeDocument/2006/relationships" xmlns:p="http://schemas.openxmlformats.org/presentationml/2006/main">
+  <p:tag name="OUTPUTDPI" val="1200"/>
+  <p:tag name="ORIGINALHEIGHT" val="103.4871"/>
+  <p:tag name="ORIGINALWIDTH" val="184.4769"/>
+  <p:tag name="LATEXADDIN" val="\documentclass{article}&#10;\usepackage{amsmath}&#10;\usepackage{amsmath,amsfonts,amssymb,amsthm}&#10;\usepackage{mathtools}&#10;\usepackage{commath}&#10;\usepackage{graphicx}&#10;\usepackage{parskip}&#10;\usepackage{enumitem}&#10;\usepackage[margin=1.0in]{geometry}&#10;\usepackage[T1]{fontenc}&#10;\usepackage{bigfoot}&#10;\usepackage[numbered,framed]{matlab-prettifier}&#10;\usepackage{filecontents}&#10;\usepackage{textcomp}&#10;\pagestyle{empty}&#10;\begin{document}&#10;&#10;&#10;\begin{align*}&#10;X_N&#10;\end{align*}&#10;&#10;\end{document}"/>
+  <p:tag name="IGUANATEXSIZE" val="20"/>
+  <p:tag name="IGUANATEXCURSOR" val="432"/>
+  <p:tag name="TRANSPARENCY" val="True"/>
+  <p:tag name="FILENAME" val=""/>
+  <p:tag name="LATEXENGINEID" val="0"/>
+  <p:tag name="TEMPFOLDER" val="c:\temp\"/>
+  <p:tag name="LATEXFORMHEIGHT" val="403"/>
+  <p:tag name="LATEXFORMWIDTH" val="688"/>
+  <p:tag name="LATEXFORMWRAP" val="True"/>
+  <p:tag name="BITMAPVECTOR" val="0"/>
+</p:tagLst>
+</file>
+
+<file path=ppt/tags/tag16.xml><?xml version="1.0" encoding="utf-8"?>
+<p:tagLst xmlns:a="http://schemas.openxmlformats.org/drawingml/2006/main" xmlns:r="http://schemas.openxmlformats.org/officeDocument/2006/relationships" xmlns:p="http://schemas.openxmlformats.org/presentationml/2006/main">
+  <p:tag name="OUTPUTDPI" val="1200"/>
+  <p:tag name="ORIGINALHEIGHT" val="98.98764"/>
+  <p:tag name="ORIGINALWIDTH" val="87.73905"/>
+  <p:tag name="LATEXADDIN" val="\documentclass{article}&#10;\usepackage{amsmath}&#10;\usepackage{amsmath,amsfonts,amssymb,amsthm}&#10;\usepackage{mathtools}&#10;\usepackage{commath}&#10;\usepackage{graphicx}&#10;\usepackage{parskip}&#10;\usepackage{enumitem}&#10;\usepackage[margin=1.0in]{geometry}&#10;\usepackage[T1]{fontenc}&#10;\usepackage{bigfoot}&#10;\usepackage[numbered,framed]{matlab-prettifier}&#10;\usepackage{filecontents}&#10;\usepackage{textcomp}&#10;\pagestyle{empty}&#10;\begin{document}&#10;&#10;&#10;\begin{align*}&#10;t_0&#10;\end{align*}&#10;&#10;\end{document}"/>
+  <p:tag name="IGUANATEXSIZE" val="20"/>
+  <p:tag name="IGUANATEXCURSOR" val="432"/>
+  <p:tag name="TRANSPARENCY" val="True"/>
+  <p:tag name="FILENAME" val=""/>
+  <p:tag name="LATEXENGINEID" val="0"/>
+  <p:tag name="TEMPFOLDER" val="c:\temp\"/>
+  <p:tag name="LATEXFORMHEIGHT" val="403"/>
+  <p:tag name="LATEXFORMWIDTH" val="688"/>
+  <p:tag name="LATEXFORMWRAP" val="True"/>
+  <p:tag name="BITMAPVECTOR" val="0"/>
+</p:tagLst>
+</file>
+
+<file path=ppt/tags/tag17.xml><?xml version="1.0" encoding="utf-8"?>
+<p:tagLst xmlns:a="http://schemas.openxmlformats.org/drawingml/2006/main" xmlns:r="http://schemas.openxmlformats.org/officeDocument/2006/relationships" xmlns:p="http://schemas.openxmlformats.org/presentationml/2006/main">
+  <p:tag name="OUTPUTDPI" val="1200"/>
   <p:tag name="ORIGINALHEIGHT" val="97.48779"/>
   <p:tag name="ORIGINALWIDTH" val="83.98952"/>
   <p:tag name="LATEXADDIN" val="\documentclass{article}&#10;\usepackage{amsmath}&#10;\usepackage{amsmath,amsfonts,amssymb,amsthm}&#10;\usepackage{mathtools}&#10;\usepackage{commath}&#10;\usepackage{graphicx}&#10;\usepackage{parskip}&#10;\usepackage{enumitem}&#10;\usepackage[margin=1.0in]{geometry}&#10;\usepackage[T1]{fontenc}&#10;\usepackage{bigfoot}&#10;\usepackage[numbered,framed]{matlab-prettifier}&#10;\usepackage{filecontents}&#10;\usepackage{textcomp}&#10;\pagestyle{empty}&#10;\begin{document}&#10;&#10;&#10;\begin{align*}&#10;t_1&#10;\end{align*}&#10;&#10;\end{document}"/>
@@ -6492,7 +7582,7 @@
 </p:tagLst>
 </file>
 
-<file path=ppt/tags/tag11.xml><?xml version="1.0" encoding="utf-8"?>
+<file path=ppt/tags/tag18.xml><?xml version="1.0" encoding="utf-8"?>
 <p:tagLst xmlns:a="http://schemas.openxmlformats.org/drawingml/2006/main" xmlns:r="http://schemas.openxmlformats.org/officeDocument/2006/relationships" xmlns:p="http://schemas.openxmlformats.org/presentationml/2006/main">
   <p:tag name="OUTPUTDPI" val="1200"/>
   <p:tag name="ORIGINALHEIGHT" val="97.48779"/>
@@ -6511,31 +7601,12 @@
 </p:tagLst>
 </file>
 
-<file path=ppt/tags/tag12.xml><?xml version="1.0" encoding="utf-8"?>
+<file path=ppt/tags/tag19.xml><?xml version="1.0" encoding="utf-8"?>
 <p:tagLst xmlns:a="http://schemas.openxmlformats.org/drawingml/2006/main" xmlns:r="http://schemas.openxmlformats.org/officeDocument/2006/relationships" xmlns:p="http://schemas.openxmlformats.org/presentationml/2006/main">
   <p:tag name="OUTPUTDPI" val="1200"/>
   <p:tag name="ORIGINALHEIGHT" val="98.98764"/>
   <p:tag name="ORIGINALWIDTH" val="87.73905"/>
   <p:tag name="LATEXADDIN" val="\documentclass{article}&#10;\usepackage{amsmath}&#10;\usepackage{amsmath,amsfonts,amssymb,amsthm}&#10;\usepackage{mathtools}&#10;\usepackage{commath}&#10;\usepackage{graphicx}&#10;\usepackage{parskip}&#10;\usepackage{enumitem}&#10;\usepackage[margin=1.0in]{geometry}&#10;\usepackage[T1]{fontenc}&#10;\usepackage{bigfoot}&#10;\usepackage[numbered,framed]{matlab-prettifier}&#10;\usepackage{filecontents}&#10;\usepackage{textcomp}&#10;\pagestyle{empty}&#10;\begin{document}&#10;&#10;&#10;\begin{align*}&#10;t_3&#10;\end{align*}&#10;&#10;\end{document}"/>
-  <p:tag name="IGUANATEXSIZE" val="20"/>
-  <p:tag name="IGUANATEXCURSOR" val="432"/>
-  <p:tag name="TRANSPARENCY" val="True"/>
-  <p:tag name="FILENAME" val=""/>
-  <p:tag name="LATEXENGINEID" val="0"/>
-  <p:tag name="TEMPFOLDER" val="c:\temp\"/>
-  <p:tag name="LATEXFORMHEIGHT" val="403"/>
-  <p:tag name="LATEXFORMWIDTH" val="688"/>
-  <p:tag name="LATEXFORMWRAP" val="True"/>
-  <p:tag name="BITMAPVECTOR" val="0"/>
-</p:tagLst>
-</file>
-
-<file path=ppt/tags/tag13.xml><?xml version="1.0" encoding="utf-8"?>
-<p:tagLst xmlns:a="http://schemas.openxmlformats.org/drawingml/2006/main" xmlns:r="http://schemas.openxmlformats.org/officeDocument/2006/relationships" xmlns:p="http://schemas.openxmlformats.org/presentationml/2006/main">
-  <p:tag name="OUTPUTDPI" val="1200"/>
-  <p:tag name="ORIGINALHEIGHT" val="97.48779"/>
-  <p:tag name="ORIGINALWIDTH" val="126.7342"/>
-  <p:tag name="LATEXADDIN" val="\documentclass{article}&#10;\usepackage{amsmath}&#10;\usepackage{amsmath,amsfonts,amssymb,amsthm}&#10;\usepackage{mathtools}&#10;\usepackage{commath}&#10;\usepackage{graphicx}&#10;\usepackage{parskip}&#10;\usepackage{enumitem}&#10;\usepackage[margin=1.0in]{geometry}&#10;\usepackage[T1]{fontenc}&#10;\usepackage{bigfoot}&#10;\usepackage[numbered,framed]{matlab-prettifier}&#10;\usepackage{filecontents}&#10;\usepackage{textcomp}&#10;\pagestyle{empty}&#10;\begin{document}&#10;&#10;&#10;\begin{align*}&#10;t_N&#10;\end{align*}&#10;&#10;\end{document}"/>
   <p:tag name="IGUANATEXSIZE" val="20"/>
   <p:tag name="IGUANATEXCURSOR" val="432"/>
   <p:tag name="TRANSPARENCY" val="True"/>
@@ -6557,6 +7628,25 @@
   <p:tag name="LATEXADDIN" val="\documentclass{article}&#10;\usepackage{amsmath}&#10;\usepackage{amsmath,amsfonts,amssymb,amsthm}&#10;\usepackage{mathtools}&#10;\usepackage{commath}&#10;\usepackage{graphicx}&#10;\usepackage{parskip}&#10;\usepackage{enumitem}&#10;\usepackage[margin=1.0in]{geometry}&#10;\usepackage[T1]{fontenc}&#10;\usepackage{bigfoot}&#10;\usepackage[numbered,framed]{matlab-prettifier}&#10;\usepackage{filecontents}&#10;\usepackage{textcomp}&#10;\pagestyle{empty}&#10;\begin{document}&#10;&#10;&#10;\begin{align*}&#10;F = m a&#10;\end{align*}&#10;&#10;\end{document}"/>
   <p:tag name="IGUANATEXSIZE" val="20"/>
   <p:tag name="IGUANATEXCURSOR" val="436"/>
+  <p:tag name="TRANSPARENCY" val="True"/>
+  <p:tag name="FILENAME" val=""/>
+  <p:tag name="LATEXENGINEID" val="0"/>
+  <p:tag name="TEMPFOLDER" val="c:\temp\"/>
+  <p:tag name="LATEXFORMHEIGHT" val="403"/>
+  <p:tag name="LATEXFORMWIDTH" val="688"/>
+  <p:tag name="LATEXFORMWRAP" val="True"/>
+  <p:tag name="BITMAPVECTOR" val="0"/>
+</p:tagLst>
+</file>
+
+<file path=ppt/tags/tag20.xml><?xml version="1.0" encoding="utf-8"?>
+<p:tagLst xmlns:a="http://schemas.openxmlformats.org/drawingml/2006/main" xmlns:r="http://schemas.openxmlformats.org/officeDocument/2006/relationships" xmlns:p="http://schemas.openxmlformats.org/presentationml/2006/main">
+  <p:tag name="OUTPUTDPI" val="1200"/>
+  <p:tag name="ORIGINALHEIGHT" val="97.48779"/>
+  <p:tag name="ORIGINALWIDTH" val="126.7342"/>
+  <p:tag name="LATEXADDIN" val="\documentclass{article}&#10;\usepackage{amsmath}&#10;\usepackage{amsmath,amsfonts,amssymb,amsthm}&#10;\usepackage{mathtools}&#10;\usepackage{commath}&#10;\usepackage{graphicx}&#10;\usepackage{parskip}&#10;\usepackage{enumitem}&#10;\usepackage[margin=1.0in]{geometry}&#10;\usepackage[T1]{fontenc}&#10;\usepackage{bigfoot}&#10;\usepackage[numbered,framed]{matlab-prettifier}&#10;\usepackage{filecontents}&#10;\usepackage{textcomp}&#10;\pagestyle{empty}&#10;\begin{document}&#10;&#10;&#10;\begin{align*}&#10;t_N&#10;\end{align*}&#10;&#10;\end{document}"/>
+  <p:tag name="IGUANATEXSIZE" val="20"/>
+  <p:tag name="IGUANATEXCURSOR" val="432"/>
   <p:tag name="TRANSPARENCY" val="True"/>
   <p:tag name="FILENAME" val=""/>
   <p:tag name="LATEXENGINEID" val="0"/>
@@ -6590,11 +7680,11 @@
 <file path=ppt/tags/tag4.xml><?xml version="1.0" encoding="utf-8"?>
 <p:tagLst xmlns:a="http://schemas.openxmlformats.org/drawingml/2006/main" xmlns:r="http://schemas.openxmlformats.org/officeDocument/2006/relationships" xmlns:p="http://schemas.openxmlformats.org/presentationml/2006/main">
   <p:tag name="OUTPUTDPI" val="1200"/>
-  <p:tag name="ORIGINALHEIGHT" val="104.9868"/>
-  <p:tag name="ORIGINALWIDTH" val="145.4818"/>
-  <p:tag name="LATEXADDIN" val="\documentclass{article}&#10;\usepackage{amsmath}&#10;\usepackage{amsmath,amsfonts,amssymb,amsthm}&#10;\usepackage{mathtools}&#10;\usepackage{commath}&#10;\usepackage{graphicx}&#10;\usepackage{parskip}&#10;\usepackage{enumitem}&#10;\usepackage[margin=1.0in]{geometry}&#10;\usepackage[T1]{fontenc}&#10;\usepackage{bigfoot}&#10;\usepackage[numbered,framed]{matlab-prettifier}&#10;\usepackage{filecontents}&#10;\usepackage{textcomp}&#10;\pagestyle{empty}&#10;\begin{document}&#10;&#10;&#10;\begin{align*}&#10;X_0&#10;\end{align*}&#10;&#10;\end{document}"/>
+  <p:tag name="ORIGINALHEIGHT" val="56.24299"/>
+  <p:tag name="ORIGINALWIDTH" val="70.49118"/>
+  <p:tag name="LATEXADDIN" val="\documentclass{article}&#10;\usepackage{amsmath}&#10;\usepackage{amsmath,amsfonts,amssymb,amsthm}&#10;\usepackage{mathtools}&#10;\usepackage{commath}&#10;\usepackage{graphicx}&#10;\usepackage{parskip}&#10;\usepackage{enumitem}&#10;\usepackage[margin=1.0in]{geometry}&#10;\usepackage[T1]{fontenc}&#10;\usepackage{bigfoot}&#10;\usepackage[numbered,framed]{matlab-prettifier}&#10;\usepackage{filecontents}&#10;\usepackage{textcomp}&#10;\pagestyle{empty}&#10;\begin{document}&#10;&#10;&#10;\begin{align*}&#10;\alpha&#10;\end{align*}&#10;&#10;\end{document}"/>
   <p:tag name="IGUANATEXSIZE" val="20"/>
-  <p:tag name="IGUANATEXCURSOR" val="432"/>
+  <p:tag name="IGUANATEXCURSOR" val="435"/>
   <p:tag name="TRANSPARENCY" val="True"/>
   <p:tag name="FILENAME" val=""/>
   <p:tag name="LATEXENGINEID" val="0"/>
@@ -6609,11 +7699,11 @@
 <file path=ppt/tags/tag5.xml><?xml version="1.0" encoding="utf-8"?>
 <p:tagLst xmlns:a="http://schemas.openxmlformats.org/drawingml/2006/main" xmlns:r="http://schemas.openxmlformats.org/officeDocument/2006/relationships" xmlns:p="http://schemas.openxmlformats.org/presentationml/2006/main">
   <p:tag name="OUTPUTDPI" val="1200"/>
-  <p:tag name="ORIGINALHEIGHT" val="103.4871"/>
-  <p:tag name="ORIGINALWIDTH" val="141.7323"/>
-  <p:tag name="LATEXADDIN" val="\documentclass{article}&#10;\usepackage{amsmath}&#10;\usepackage{amsmath,amsfonts,amssymb,amsthm}&#10;\usepackage{mathtools}&#10;\usepackage{commath}&#10;\usepackage{graphicx}&#10;\usepackage{parskip}&#10;\usepackage{enumitem}&#10;\usepackage[margin=1.0in]{geometry}&#10;\usepackage[T1]{fontenc}&#10;\usepackage{bigfoot}&#10;\usepackage[numbered,framed]{matlab-prettifier}&#10;\usepackage{filecontents}&#10;\usepackage{textcomp}&#10;\pagestyle{empty}&#10;\begin{document}&#10;&#10;&#10;\begin{align*}&#10;X_1&#10;\end{align*}&#10;&#10;\end{document}"/>
+  <p:tag name="ORIGINALHEIGHT" val="56.24299"/>
+  <p:tag name="ORIGINALWIDTH" val="62.99213"/>
+  <p:tag name="LATEXADDIN" val="\documentclass{article}&#10;\usepackage{amsmath}&#10;\usepackage{amsmath,amsfonts,amssymb,amsthm}&#10;\usepackage{mathtools}&#10;\usepackage{commath}&#10;\usepackage{graphicx}&#10;\usepackage{parskip}&#10;\usepackage{enumitem}&#10;\usepackage[margin=1.0in]{geometry}&#10;\usepackage[T1]{fontenc}&#10;\usepackage{bigfoot}&#10;\usepackage[numbered,framed]{matlab-prettifier}&#10;\usepackage{filecontents}&#10;\usepackage{textcomp}&#10;\pagestyle{empty}&#10;\begin{document}&#10;&#10;&#10;\begin{align*}&#10;x&#10;\end{align*}&#10;&#10;\end{document}"/>
   <p:tag name="IGUANATEXSIZE" val="20"/>
-  <p:tag name="IGUANATEXCURSOR" val="432"/>
+  <p:tag name="IGUANATEXCURSOR" val="430"/>
   <p:tag name="TRANSPARENCY" val="True"/>
   <p:tag name="FILENAME" val=""/>
   <p:tag name="LATEXENGINEID" val="0"/>
@@ -6628,11 +7718,11 @@
 <file path=ppt/tags/tag6.xml><?xml version="1.0" encoding="utf-8"?>
 <p:tagLst xmlns:a="http://schemas.openxmlformats.org/drawingml/2006/main" xmlns:r="http://schemas.openxmlformats.org/officeDocument/2006/relationships" xmlns:p="http://schemas.openxmlformats.org/presentationml/2006/main">
   <p:tag name="OUTPUTDPI" val="1200"/>
-  <p:tag name="ORIGINALHEIGHT" val="103.4871"/>
-  <p:tag name="ORIGINALWIDTH" val="144.7319"/>
-  <p:tag name="LATEXADDIN" val="\documentclass{article}&#10;\usepackage{amsmath}&#10;\usepackage{amsmath,amsfonts,amssymb,amsthm}&#10;\usepackage{mathtools}&#10;\usepackage{commath}&#10;\usepackage{graphicx}&#10;\usepackage{parskip}&#10;\usepackage{enumitem}&#10;\usepackage[margin=1.0in]{geometry}&#10;\usepackage[T1]{fontenc}&#10;\usepackage{bigfoot}&#10;\usepackage[numbered,framed]{matlab-prettifier}&#10;\usepackage{filecontents}&#10;\usepackage{textcomp}&#10;\pagestyle{empty}&#10;\begin{document}&#10;&#10;&#10;\begin{align*}&#10;X_2&#10;\end{align*}&#10;&#10;\end{document}"/>
+  <p:tag name="ORIGINALHEIGHT" val="80.24"/>
+  <p:tag name="ORIGINALWIDTH" val="58.49268"/>
+  <p:tag name="LATEXADDIN" val="\documentclass{article}&#10;\usepackage{amsmath}&#10;\usepackage{amsmath,amsfonts,amssymb,amsthm}&#10;\usepackage{mathtools}&#10;\usepackage{commath}&#10;\usepackage{graphicx}&#10;\usepackage{parskip}&#10;\usepackage{enumitem}&#10;\usepackage[margin=1.0in]{geometry}&#10;\usepackage[T1]{fontenc}&#10;\usepackage{bigfoot}&#10;\usepackage[numbered,framed]{matlab-prettifier}&#10;\usepackage{filecontents}&#10;\usepackage{textcomp}&#10;\pagestyle{empty}&#10;\begin{document}&#10;&#10;&#10;\begin{align*}&#10;y&#10;\end{align*}&#10;&#10;\end{document}"/>
   <p:tag name="IGUANATEXSIZE" val="20"/>
-  <p:tag name="IGUANATEXCURSOR" val="432"/>
+  <p:tag name="IGUANATEXCURSOR" val="430"/>
   <p:tag name="TRANSPARENCY" val="True"/>
   <p:tag name="FILENAME" val=""/>
   <p:tag name="LATEXENGINEID" val="0"/>
@@ -6647,11 +7737,11 @@
 <file path=ppt/tags/tag7.xml><?xml version="1.0" encoding="utf-8"?>
 <p:tagLst xmlns:a="http://schemas.openxmlformats.org/drawingml/2006/main" xmlns:r="http://schemas.openxmlformats.org/officeDocument/2006/relationships" xmlns:p="http://schemas.openxmlformats.org/presentationml/2006/main">
   <p:tag name="OUTPUTDPI" val="1200"/>
-  <p:tag name="ORIGINALHEIGHT" val="104.9868"/>
-  <p:tag name="ORIGINALWIDTH" val="145.4818"/>
-  <p:tag name="LATEXADDIN" val="\documentclass{article}&#10;\usepackage{amsmath}&#10;\usepackage{amsmath,amsfonts,amssymb,amsthm}&#10;\usepackage{mathtools}&#10;\usepackage{commath}&#10;\usepackage{graphicx}&#10;\usepackage{parskip}&#10;\usepackage{enumitem}&#10;\usepackage[margin=1.0in]{geometry}&#10;\usepackage[T1]{fontenc}&#10;\usepackage{bigfoot}&#10;\usepackage[numbered,framed]{matlab-prettifier}&#10;\usepackage{filecontents}&#10;\usepackage{textcomp}&#10;\pagestyle{empty}&#10;\begin{document}&#10;&#10;&#10;\begin{align*}&#10;X_3&#10;\end{align*}&#10;&#10;\end{document}"/>
+  <p:tag name="ORIGINALHEIGHT" val="121.4848"/>
+  <p:tag name="ORIGINALWIDTH" val="467.9415"/>
+  <p:tag name="LATEXADDIN" val="\documentclass{article}&#10;\usepackage{amsmath}&#10;\usepackage{amsmath,amsfonts,amssymb,amsthm}&#10;\usepackage{mathtools}&#10;\usepackage{commath}&#10;\usepackage{graphicx}&#10;\usepackage{parskip}&#10;\usepackage{enumitem}&#10;\usepackage[margin=1.0in]{geometry}&#10;\usepackage[T1]{fontenc}&#10;\usepackage{bigfoot}&#10;\usepackage[numbered,framed]{matlab-prettifier}&#10;\usepackage{filecontents}&#10;\usepackage{textcomp}&#10;\pagestyle{empty}&#10;\begin{document}&#10;&#10;&#10;\begin{align*}&#10;F_g = m g&#10;\end{align*}&#10;&#10;\end{document}"/>
   <p:tag name="IGUANATEXSIZE" val="20"/>
-  <p:tag name="IGUANATEXCURSOR" val="432"/>
+  <p:tag name="IGUANATEXCURSOR" val="438"/>
   <p:tag name="TRANSPARENCY" val="True"/>
   <p:tag name="FILENAME" val=""/>
   <p:tag name="LATEXENGINEID" val="0"/>
@@ -6666,11 +7756,11 @@
 <file path=ppt/tags/tag8.xml><?xml version="1.0" encoding="utf-8"?>
 <p:tagLst xmlns:a="http://schemas.openxmlformats.org/drawingml/2006/main" xmlns:r="http://schemas.openxmlformats.org/officeDocument/2006/relationships" xmlns:p="http://schemas.openxmlformats.org/presentationml/2006/main">
   <p:tag name="OUTPUTDPI" val="1200"/>
-  <p:tag name="ORIGINALHEIGHT" val="103.4871"/>
-  <p:tag name="ORIGINALWIDTH" val="184.4769"/>
-  <p:tag name="LATEXADDIN" val="\documentclass{article}&#10;\usepackage{amsmath}&#10;\usepackage{amsmath,amsfonts,amssymb,amsthm}&#10;\usepackage{mathtools}&#10;\usepackage{commath}&#10;\usepackage{graphicx}&#10;\usepackage{parskip}&#10;\usepackage{enumitem}&#10;\usepackage[margin=1.0in]{geometry}&#10;\usepackage[T1]{fontenc}&#10;\usepackage{bigfoot}&#10;\usepackage[numbered,framed]{matlab-prettifier}&#10;\usepackage{filecontents}&#10;\usepackage{textcomp}&#10;\pagestyle{empty}&#10;\begin{document}&#10;&#10;&#10;\begin{align*}&#10;X_N&#10;\end{align*}&#10;&#10;\end{document}"/>
-  <p:tag name="IGUANATEXSIZE" val="20"/>
-  <p:tag name="IGUANATEXCURSOR" val="432"/>
+  <p:tag name="ORIGINALHEIGHT" val="326.9591"/>
+  <p:tag name="ORIGINALWIDTH" val="233.9708"/>
+  <p:tag name="LATEXADDIN" val="\documentclass{article}&#10;\usepackage{amsmath}&#10;\usepackage{amsmath,amsfonts,amssymb,amsthm}&#10;\usepackage{mathtools}&#10;\usepackage{commath}&#10;\usepackage{graphicx}&#10;\usepackage{parskip}&#10;\usepackage{enumitem}&#10;\usepackage[margin=1.0in]{geometry}&#10;\usepackage[T1]{fontenc}&#10;\usepackage{bigfoot}&#10;\usepackage[numbered,framed]{matlab-prettifier}&#10;\usepackage{filecontents}&#10;\usepackage{textcomp}&#10;\pagestyle{empty}&#10;\begin{document}&#10;&#10;&#10;\begin{align*}&#10;\begin{bmatrix}&#10;p \\ v&#10;\end{bmatrix}^T&#10;\end{align*}&#10;&#10;\end{document}"/>
+  <p:tag name="IGUANATEXSIZE" val="18"/>
+  <p:tag name="IGUANATEXCURSOR" val="449"/>
   <p:tag name="TRANSPARENCY" val="True"/>
   <p:tag name="FILENAME" val=""/>
   <p:tag name="LATEXENGINEID" val="0"/>
@@ -6685,11 +7775,11 @@
 <file path=ppt/tags/tag9.xml><?xml version="1.0" encoding="utf-8"?>
 <p:tagLst xmlns:a="http://schemas.openxmlformats.org/drawingml/2006/main" xmlns:r="http://schemas.openxmlformats.org/officeDocument/2006/relationships" xmlns:p="http://schemas.openxmlformats.org/presentationml/2006/main">
   <p:tag name="OUTPUTDPI" val="1200"/>
-  <p:tag name="ORIGINALHEIGHT" val="98.98764"/>
-  <p:tag name="ORIGINALWIDTH" val="87.73905"/>
-  <p:tag name="LATEXADDIN" val="\documentclass{article}&#10;\usepackage{amsmath}&#10;\usepackage{amsmath,amsfonts,amssymb,amsthm}&#10;\usepackage{mathtools}&#10;\usepackage{commath}&#10;\usepackage{graphicx}&#10;\usepackage{parskip}&#10;\usepackage{enumitem}&#10;\usepackage[margin=1.0in]{geometry}&#10;\usepackage[T1]{fontenc}&#10;\usepackage{bigfoot}&#10;\usepackage[numbered,framed]{matlab-prettifier}&#10;\usepackage{filecontents}&#10;\usepackage{textcomp}&#10;\pagestyle{empty}&#10;\begin{document}&#10;&#10;&#10;\begin{align*}&#10;t_0&#10;\end{align*}&#10;&#10;\end{document}"/>
+  <p:tag name="ORIGINALHEIGHT" val="86.23921"/>
+  <p:tag name="ORIGINALWIDTH" val="430.4462"/>
+  <p:tag name="LATEXADDIN" val="\documentclass{article}&#10;\usepackage{amsmath}&#10;\usepackage{amsmath,amsfonts,amssymb,amsthm}&#10;\usepackage{mathtools}&#10;\usepackage{commath}&#10;\usepackage{graphicx}&#10;\usepackage{parskip}&#10;\usepackage{enumitem}&#10;\usepackage[margin=1.0in]{geometry}&#10;\usepackage[T1]{fontenc}&#10;\usepackage{bigfoot}&#10;\usepackage[numbered,framed]{matlab-prettifier}&#10;\usepackage{filecontents}&#10;\usepackage{textcomp}&#10;\pagestyle{empty}&#10;\begin{document}&#10;&#10;&#10;\begin{align*}&#10;F = m a&#10;\end{align*}&#10;&#10;\end{document}"/>
   <p:tag name="IGUANATEXSIZE" val="20"/>
-  <p:tag name="IGUANATEXCURSOR" val="432"/>
+  <p:tag name="IGUANATEXCURSOR" val="436"/>
   <p:tag name="TRANSPARENCY" val="True"/>
   <p:tag name="FILENAME" val=""/>
   <p:tag name="LATEXENGINEID" val="0"/>

</xml_diff>